<commit_message>
newest batch of scientists, added everyone to Knight 3rd edition, everyone has a photo
</commit_message>
<xml_diff>
--- a/Textbooks/Arthur Walker Jr..pptx
+++ b/Textbooks/Arthur Walker Jr..pptx
@@ -519,6 +519,10 @@
             <a:br/>
             <a:r>
               <a:t>Knight, Physics for Scientists and Engineers: A Strategic Approach with Modern Physics, 3rd Edition, Chapter 19</a:t>
+            </a:r>
+            <a:br/>
+            <a:r>
+              <a:t>Knight, Physics for Scientists and Engineers: A Strategic Approach with Modern Physics, 3rd Edition, Chapter 24</a:t>
             </a:r>
             <a:br/>
             <a:r>

</xml_diff>